<commit_message>
red, blue, orange attacked, dying effect, die 구현 / player_bullet ↔ red, orange, blue 충돌체크 구현
</commit_message>
<xml_diff>
--- a/제작.pptx
+++ b/제작.pptx
@@ -25,6 +25,7 @@
     <p:sldId id="273" r:id="rId19"/>
     <p:sldId id="274" r:id="rId20"/>
     <p:sldId id="275" r:id="rId21"/>
+    <p:sldId id="276" r:id="rId22"/>
   </p:sldIdLst>
   <p:sldSz cx="12192000" cy="6858000"/>
   <p:notesSz cx="6858000" cy="9144000"/>
@@ -282,7 +283,7 @@
           <a:p>
             <a:fld id="{667511D5-E30B-4E6C-8572-0CA724416369}" type="datetimeFigureOut">
               <a:rPr lang="ko-KR" altLang="en-US" smtClean="0"/>
-              <a:t>2017-12-23</a:t>
+              <a:t>2017-12-24</a:t>
             </a:fld>
             <a:endParaRPr lang="ko-KR" altLang="en-US"/>
           </a:p>
@@ -480,7 +481,7 @@
           <a:p>
             <a:fld id="{667511D5-E30B-4E6C-8572-0CA724416369}" type="datetimeFigureOut">
               <a:rPr lang="ko-KR" altLang="en-US" smtClean="0"/>
-              <a:t>2017-12-23</a:t>
+              <a:t>2017-12-24</a:t>
             </a:fld>
             <a:endParaRPr lang="ko-KR" altLang="en-US"/>
           </a:p>
@@ -688,7 +689,7 @@
           <a:p>
             <a:fld id="{667511D5-E30B-4E6C-8572-0CA724416369}" type="datetimeFigureOut">
               <a:rPr lang="ko-KR" altLang="en-US" smtClean="0"/>
-              <a:t>2017-12-23</a:t>
+              <a:t>2017-12-24</a:t>
             </a:fld>
             <a:endParaRPr lang="ko-KR" altLang="en-US"/>
           </a:p>
@@ -886,7 +887,7 @@
           <a:p>
             <a:fld id="{667511D5-E30B-4E6C-8572-0CA724416369}" type="datetimeFigureOut">
               <a:rPr lang="ko-KR" altLang="en-US" smtClean="0"/>
-              <a:t>2017-12-23</a:t>
+              <a:t>2017-12-24</a:t>
             </a:fld>
             <a:endParaRPr lang="ko-KR" altLang="en-US"/>
           </a:p>
@@ -1161,7 +1162,7 @@
           <a:p>
             <a:fld id="{667511D5-E30B-4E6C-8572-0CA724416369}" type="datetimeFigureOut">
               <a:rPr lang="ko-KR" altLang="en-US" smtClean="0"/>
-              <a:t>2017-12-23</a:t>
+              <a:t>2017-12-24</a:t>
             </a:fld>
             <a:endParaRPr lang="ko-KR" altLang="en-US"/>
           </a:p>
@@ -1426,7 +1427,7 @@
           <a:p>
             <a:fld id="{667511D5-E30B-4E6C-8572-0CA724416369}" type="datetimeFigureOut">
               <a:rPr lang="ko-KR" altLang="en-US" smtClean="0"/>
-              <a:t>2017-12-23</a:t>
+              <a:t>2017-12-24</a:t>
             </a:fld>
             <a:endParaRPr lang="ko-KR" altLang="en-US"/>
           </a:p>
@@ -1838,7 +1839,7 @@
           <a:p>
             <a:fld id="{667511D5-E30B-4E6C-8572-0CA724416369}" type="datetimeFigureOut">
               <a:rPr lang="ko-KR" altLang="en-US" smtClean="0"/>
-              <a:t>2017-12-23</a:t>
+              <a:t>2017-12-24</a:t>
             </a:fld>
             <a:endParaRPr lang="ko-KR" altLang="en-US"/>
           </a:p>
@@ -1979,7 +1980,7 @@
           <a:p>
             <a:fld id="{667511D5-E30B-4E6C-8572-0CA724416369}" type="datetimeFigureOut">
               <a:rPr lang="ko-KR" altLang="en-US" smtClean="0"/>
-              <a:t>2017-12-23</a:t>
+              <a:t>2017-12-24</a:t>
             </a:fld>
             <a:endParaRPr lang="ko-KR" altLang="en-US"/>
           </a:p>
@@ -2092,7 +2093,7 @@
           <a:p>
             <a:fld id="{667511D5-E30B-4E6C-8572-0CA724416369}" type="datetimeFigureOut">
               <a:rPr lang="ko-KR" altLang="en-US" smtClean="0"/>
-              <a:t>2017-12-23</a:t>
+              <a:t>2017-12-24</a:t>
             </a:fld>
             <a:endParaRPr lang="ko-KR" altLang="en-US"/>
           </a:p>
@@ -2403,7 +2404,7 @@
           <a:p>
             <a:fld id="{667511D5-E30B-4E6C-8572-0CA724416369}" type="datetimeFigureOut">
               <a:rPr lang="ko-KR" altLang="en-US" smtClean="0"/>
-              <a:t>2017-12-23</a:t>
+              <a:t>2017-12-24</a:t>
             </a:fld>
             <a:endParaRPr lang="ko-KR" altLang="en-US"/>
           </a:p>
@@ -2691,7 +2692,7 @@
           <a:p>
             <a:fld id="{667511D5-E30B-4E6C-8572-0CA724416369}" type="datetimeFigureOut">
               <a:rPr lang="ko-KR" altLang="en-US" smtClean="0"/>
-              <a:t>2017-12-23</a:t>
+              <a:t>2017-12-24</a:t>
             </a:fld>
             <a:endParaRPr lang="ko-KR" altLang="en-US"/>
           </a:p>
@@ -2932,7 +2933,7 @@
           <a:p>
             <a:fld id="{667511D5-E30B-4E6C-8572-0CA724416369}" type="datetimeFigureOut">
               <a:rPr lang="ko-KR" altLang="en-US" smtClean="0"/>
-              <a:t>2017-12-23</a:t>
+              <a:t>2017-12-24</a:t>
             </a:fld>
             <a:endParaRPr lang="ko-KR" altLang="en-US"/>
           </a:p>
@@ -10850,6 +10851,424 @@
 </p:sld>
 </file>
 
+<file path=ppt/slides/slide21.xml><?xml version="1.0" encoding="utf-8"?>
+<p:sld xmlns:a="http://schemas.openxmlformats.org/drawingml/2006/main" xmlns:r="http://schemas.openxmlformats.org/officeDocument/2006/relationships" xmlns:p="http://schemas.openxmlformats.org/presentationml/2006/main">
+  <p:cSld>
+    <p:bg>
+      <p:bgPr>
+        <a:solidFill>
+          <a:schemeClr val="bg1"/>
+        </a:solidFill>
+        <a:effectLst/>
+      </p:bgPr>
+    </p:bg>
+    <p:spTree>
+      <p:nvGrpSpPr>
+        <p:cNvPr id="1" name=""/>
+        <p:cNvGrpSpPr/>
+        <p:nvPr/>
+      </p:nvGrpSpPr>
+      <p:grpSpPr>
+        <a:xfrm>
+          <a:off x="0" y="0"/>
+          <a:ext cx="0" cy="0"/>
+          <a:chOff x="0" y="0"/>
+          <a:chExt cx="0" cy="0"/>
+        </a:xfrm>
+      </p:grpSpPr>
+      <p:pic>
+        <p:nvPicPr>
+          <p:cNvPr id="3" name="그림 2">
+            <a:extLst>
+              <a:ext uri="{FF2B5EF4-FFF2-40B4-BE49-F238E27FC236}">
+                <a16:creationId xmlns:a16="http://schemas.microsoft.com/office/drawing/2014/main" id="{70FEC2F1-7A8D-4199-BDBA-E589EBB63F8B}"/>
+              </a:ext>
+            </a:extLst>
+          </p:cNvPr>
+          <p:cNvPicPr>
+            <a:picLocks noChangeAspect="1"/>
+          </p:cNvPicPr>
+          <p:nvPr/>
+        </p:nvPicPr>
+        <p:blipFill>
+          <a:blip r:embed="rId2">
+            <a:extLst>
+              <a:ext uri="{28A0092B-C50C-407E-A947-70E740481C1C}">
+                <a14:useLocalDpi xmlns:a14="http://schemas.microsoft.com/office/drawing/2010/main" val="0"/>
+              </a:ext>
+            </a:extLst>
+          </a:blip>
+          <a:stretch>
+            <a:fillRect/>
+          </a:stretch>
+        </p:blipFill>
+        <p:spPr>
+          <a:xfrm>
+            <a:off x="540297" y="1974221"/>
+            <a:ext cx="1771897" cy="1152686"/>
+          </a:xfrm>
+          <a:prstGeom prst="rect">
+            <a:avLst/>
+          </a:prstGeom>
+        </p:spPr>
+      </p:pic>
+      <p:pic>
+        <p:nvPicPr>
+          <p:cNvPr id="5" name="그림 4">
+            <a:extLst>
+              <a:ext uri="{FF2B5EF4-FFF2-40B4-BE49-F238E27FC236}">
+                <a16:creationId xmlns:a16="http://schemas.microsoft.com/office/drawing/2014/main" id="{D7B5E906-F801-4878-8C7F-9468C9190E77}"/>
+              </a:ext>
+            </a:extLst>
+          </p:cNvPr>
+          <p:cNvPicPr>
+            <a:picLocks noChangeAspect="1"/>
+          </p:cNvPicPr>
+          <p:nvPr/>
+        </p:nvPicPr>
+        <p:blipFill>
+          <a:blip r:embed="rId3">
+            <a:extLst>
+              <a:ext uri="{28A0092B-C50C-407E-A947-70E740481C1C}">
+                <a14:useLocalDpi xmlns:a14="http://schemas.microsoft.com/office/drawing/2010/main" val="0"/>
+              </a:ext>
+            </a:extLst>
+          </a:blip>
+          <a:stretch>
+            <a:fillRect/>
+          </a:stretch>
+        </p:blipFill>
+        <p:spPr>
+          <a:xfrm>
+            <a:off x="-245213" y="3126907"/>
+            <a:ext cx="2306684" cy="1218481"/>
+          </a:xfrm>
+          <a:prstGeom prst="rect">
+            <a:avLst/>
+          </a:prstGeom>
+        </p:spPr>
+      </p:pic>
+      <p:pic>
+        <p:nvPicPr>
+          <p:cNvPr id="9" name="그림 8">
+            <a:extLst>
+              <a:ext uri="{FF2B5EF4-FFF2-40B4-BE49-F238E27FC236}">
+                <a16:creationId xmlns:a16="http://schemas.microsoft.com/office/drawing/2014/main" id="{D39ADA2B-1A90-489A-B7FE-6E37F59A1886}"/>
+              </a:ext>
+            </a:extLst>
+          </p:cNvPr>
+          <p:cNvPicPr>
+            <a:picLocks noChangeAspect="1"/>
+          </p:cNvPicPr>
+          <p:nvPr/>
+        </p:nvPicPr>
+        <p:blipFill>
+          <a:blip r:embed="rId4">
+            <a:extLst>
+              <a:ext uri="{28A0092B-C50C-407E-A947-70E740481C1C}">
+                <a14:useLocalDpi xmlns:a14="http://schemas.microsoft.com/office/drawing/2010/main" val="0"/>
+              </a:ext>
+            </a:extLst>
+          </a:blip>
+          <a:stretch>
+            <a:fillRect/>
+          </a:stretch>
+        </p:blipFill>
+        <p:spPr>
+          <a:xfrm>
+            <a:off x="2918814" y="473944"/>
+            <a:ext cx="1905266" cy="1286054"/>
+          </a:xfrm>
+          <a:prstGeom prst="rect">
+            <a:avLst/>
+          </a:prstGeom>
+        </p:spPr>
+      </p:pic>
+      <p:pic>
+        <p:nvPicPr>
+          <p:cNvPr id="11" name="그림 10">
+            <a:extLst>
+              <a:ext uri="{FF2B5EF4-FFF2-40B4-BE49-F238E27FC236}">
+                <a16:creationId xmlns:a16="http://schemas.microsoft.com/office/drawing/2014/main" id="{F599474D-A354-4D22-B352-F3E4429C4AA5}"/>
+              </a:ext>
+            </a:extLst>
+          </p:cNvPr>
+          <p:cNvPicPr>
+            <a:picLocks noChangeAspect="1"/>
+          </p:cNvPicPr>
+          <p:nvPr/>
+        </p:nvPicPr>
+        <p:blipFill>
+          <a:blip r:embed="rId4">
+            <a:extLst>
+              <a:ext uri="{28A0092B-C50C-407E-A947-70E740481C1C}">
+                <a14:useLocalDpi xmlns:a14="http://schemas.microsoft.com/office/drawing/2010/main" val="0"/>
+              </a:ext>
+            </a:extLst>
+          </a:blip>
+          <a:stretch>
+            <a:fillRect/>
+          </a:stretch>
+        </p:blipFill>
+        <p:spPr>
+          <a:xfrm>
+            <a:off x="540297" y="473944"/>
+            <a:ext cx="1905266" cy="1286054"/>
+          </a:xfrm>
+          <a:prstGeom prst="rect">
+            <a:avLst/>
+          </a:prstGeom>
+        </p:spPr>
+      </p:pic>
+      <p:pic>
+        <p:nvPicPr>
+          <p:cNvPr id="13" name="그림 12">
+            <a:extLst>
+              <a:ext uri="{FF2B5EF4-FFF2-40B4-BE49-F238E27FC236}">
+                <a16:creationId xmlns:a16="http://schemas.microsoft.com/office/drawing/2014/main" id="{B7C272E6-21D3-4682-A97E-DC125CA8214A}"/>
+              </a:ext>
+            </a:extLst>
+          </p:cNvPr>
+          <p:cNvPicPr>
+            <a:picLocks noChangeAspect="1"/>
+          </p:cNvPicPr>
+          <p:nvPr/>
+        </p:nvPicPr>
+        <p:blipFill>
+          <a:blip r:embed="rId2">
+            <a:extLst>
+              <a:ext uri="{28A0092B-C50C-407E-A947-70E740481C1C}">
+                <a14:useLocalDpi xmlns:a14="http://schemas.microsoft.com/office/drawing/2010/main" val="0"/>
+              </a:ext>
+            </a:extLst>
+          </a:blip>
+          <a:stretch>
+            <a:fillRect/>
+          </a:stretch>
+        </p:blipFill>
+        <p:spPr>
+          <a:xfrm>
+            <a:off x="2985498" y="1974221"/>
+            <a:ext cx="1771897" cy="1152686"/>
+          </a:xfrm>
+          <a:prstGeom prst="rect">
+            <a:avLst/>
+          </a:prstGeom>
+        </p:spPr>
+      </p:pic>
+      <p:sp>
+        <p:nvSpPr>
+          <p:cNvPr id="14" name="타원 13">
+            <a:extLst>
+              <a:ext uri="{FF2B5EF4-FFF2-40B4-BE49-F238E27FC236}">
+                <a16:creationId xmlns:a16="http://schemas.microsoft.com/office/drawing/2014/main" id="{D5DD338F-DCD3-4B77-A796-AA759EA588A9}"/>
+              </a:ext>
+            </a:extLst>
+          </p:cNvPr>
+          <p:cNvSpPr/>
+          <p:nvPr/>
+        </p:nvSpPr>
+        <p:spPr>
+          <a:xfrm>
+            <a:off x="3187865" y="2174326"/>
+            <a:ext cx="1367161" cy="807868"/>
+          </a:xfrm>
+          <a:prstGeom prst="ellipse">
+            <a:avLst/>
+          </a:prstGeom>
+          <a:gradFill flip="none" rotWithShape="1">
+            <a:gsLst>
+              <a:gs pos="0">
+                <a:srgbClr val="FFFF00">
+                  <a:alpha val="70000"/>
+                </a:srgbClr>
+              </a:gs>
+              <a:gs pos="100000">
+                <a:srgbClr val="FFFF00">
+                  <a:alpha val="0"/>
+                </a:srgbClr>
+              </a:gs>
+            </a:gsLst>
+            <a:path path="circle">
+              <a:fillToRect l="50000" t="50000" r="50000" b="50000"/>
+            </a:path>
+            <a:tileRect/>
+          </a:gradFill>
+          <a:ln>
+            <a:noFill/>
+          </a:ln>
+        </p:spPr>
+        <p:style>
+          <a:lnRef idx="2">
+            <a:schemeClr val="accent1">
+              <a:shade val="50000"/>
+            </a:schemeClr>
+          </a:lnRef>
+          <a:fillRef idx="1">
+            <a:schemeClr val="accent1"/>
+          </a:fillRef>
+          <a:effectRef idx="0">
+            <a:schemeClr val="accent1"/>
+          </a:effectRef>
+          <a:fontRef idx="minor">
+            <a:schemeClr val="lt1"/>
+          </a:fontRef>
+        </p:style>
+        <p:txBody>
+          <a:bodyPr rtlCol="0" anchor="ctr"/>
+          <a:lstStyle/>
+          <a:p>
+            <a:pPr algn="ctr"/>
+            <a:endParaRPr lang="ko-KR" altLang="en-US"/>
+          </a:p>
+        </p:txBody>
+      </p:sp>
+      <p:pic>
+        <p:nvPicPr>
+          <p:cNvPr id="15" name="그림 14">
+            <a:extLst>
+              <a:ext uri="{FF2B5EF4-FFF2-40B4-BE49-F238E27FC236}">
+                <a16:creationId xmlns:a16="http://schemas.microsoft.com/office/drawing/2014/main" id="{9BCC5425-F00D-439B-98C7-8107D0130302}"/>
+              </a:ext>
+            </a:extLst>
+          </p:cNvPr>
+          <p:cNvPicPr>
+            <a:picLocks noChangeAspect="1"/>
+          </p:cNvPicPr>
+          <p:nvPr/>
+        </p:nvPicPr>
+        <p:blipFill>
+          <a:blip r:embed="rId3">
+            <a:extLst>
+              <a:ext uri="{28A0092B-C50C-407E-A947-70E740481C1C}">
+                <a14:useLocalDpi xmlns:a14="http://schemas.microsoft.com/office/drawing/2010/main" val="0"/>
+              </a:ext>
+            </a:extLst>
+          </a:blip>
+          <a:stretch>
+            <a:fillRect/>
+          </a:stretch>
+        </p:blipFill>
+        <p:spPr>
+          <a:xfrm>
+            <a:off x="2136037" y="3126907"/>
+            <a:ext cx="2306684" cy="1218481"/>
+          </a:xfrm>
+          <a:prstGeom prst="rect">
+            <a:avLst/>
+          </a:prstGeom>
+        </p:spPr>
+      </p:pic>
+      <p:sp>
+        <p:nvSpPr>
+          <p:cNvPr id="16" name="타원 15">
+            <a:extLst>
+              <a:ext uri="{FF2B5EF4-FFF2-40B4-BE49-F238E27FC236}">
+                <a16:creationId xmlns:a16="http://schemas.microsoft.com/office/drawing/2014/main" id="{92A22F24-F95C-484D-8909-28B64AF90987}"/>
+              </a:ext>
+            </a:extLst>
+          </p:cNvPr>
+          <p:cNvSpPr/>
+          <p:nvPr/>
+        </p:nvSpPr>
+        <p:spPr>
+          <a:xfrm>
+            <a:off x="3159065" y="3466363"/>
+            <a:ext cx="1367161" cy="807868"/>
+          </a:xfrm>
+          <a:prstGeom prst="ellipse">
+            <a:avLst/>
+          </a:prstGeom>
+          <a:gradFill flip="none" rotWithShape="1">
+            <a:gsLst>
+              <a:gs pos="0">
+                <a:srgbClr val="FFFF00">
+                  <a:alpha val="70000"/>
+                </a:srgbClr>
+              </a:gs>
+              <a:gs pos="100000">
+                <a:srgbClr val="FFFF00">
+                  <a:alpha val="0"/>
+                </a:srgbClr>
+              </a:gs>
+            </a:gsLst>
+            <a:path path="circle">
+              <a:fillToRect l="50000" t="50000" r="50000" b="50000"/>
+            </a:path>
+            <a:tileRect/>
+          </a:gradFill>
+          <a:ln>
+            <a:noFill/>
+          </a:ln>
+        </p:spPr>
+        <p:style>
+          <a:lnRef idx="2">
+            <a:schemeClr val="accent1">
+              <a:shade val="50000"/>
+            </a:schemeClr>
+          </a:lnRef>
+          <a:fillRef idx="1">
+            <a:schemeClr val="accent1"/>
+          </a:fillRef>
+          <a:effectRef idx="0">
+            <a:schemeClr val="accent1"/>
+          </a:effectRef>
+          <a:fontRef idx="minor">
+            <a:schemeClr val="lt1"/>
+          </a:fontRef>
+        </p:style>
+        <p:txBody>
+          <a:bodyPr rtlCol="0" anchor="ctr"/>
+          <a:lstStyle/>
+          <a:p>
+            <a:pPr algn="ctr"/>
+            <a:endParaRPr lang="ko-KR" altLang="en-US"/>
+          </a:p>
+        </p:txBody>
+      </p:sp>
+      <p:pic>
+        <p:nvPicPr>
+          <p:cNvPr id="17" name="그림 16">
+            <a:extLst>
+              <a:ext uri="{FF2B5EF4-FFF2-40B4-BE49-F238E27FC236}">
+                <a16:creationId xmlns:a16="http://schemas.microsoft.com/office/drawing/2014/main" id="{C3AE7F37-F9B1-4DA0-AE90-BC26FA7B77BD}"/>
+              </a:ext>
+            </a:extLst>
+          </p:cNvPr>
+          <p:cNvPicPr>
+            <a:picLocks noChangeAspect="1"/>
+          </p:cNvPicPr>
+          <p:nvPr/>
+        </p:nvPicPr>
+        <p:blipFill>
+          <a:blip r:embed="rId5"/>
+          <a:stretch>
+            <a:fillRect/>
+          </a:stretch>
+        </p:blipFill>
+        <p:spPr>
+          <a:xfrm>
+            <a:off x="5410397" y="469351"/>
+            <a:ext cx="2771775" cy="1704975"/>
+          </a:xfrm>
+          <a:prstGeom prst="rect">
+            <a:avLst/>
+          </a:prstGeom>
+        </p:spPr>
+      </p:pic>
+    </p:spTree>
+    <p:extLst>
+      <p:ext uri="{BB962C8B-B14F-4D97-AF65-F5344CB8AC3E}">
+        <p14:creationId xmlns:p14="http://schemas.microsoft.com/office/powerpoint/2010/main" val="1120648209"/>
+      </p:ext>
+    </p:extLst>
+  </p:cSld>
+  <p:clrMapOvr>
+    <a:masterClrMapping/>
+  </p:clrMapOvr>
+</p:sld>
+</file>
+
 <file path=ppt/slides/slide3.xml><?xml version="1.0" encoding="utf-8"?>
 <p:sld xmlns:a="http://schemas.openxmlformats.org/drawingml/2006/main" xmlns:r="http://schemas.openxmlformats.org/officeDocument/2006/relationships" xmlns:p="http://schemas.openxmlformats.org/presentationml/2006/main">
   <p:cSld>

</xml_diff>

<commit_message>
bramble, green_light, blue_light 스프라이트 리소스 제작 / 게임 화면에 brameble, grenn_light, blue_light 그리기 / brameble 게임 기능 구현
</commit_message>
<xml_diff>
--- a/제작.pptx
+++ b/제작.pptx
@@ -27,6 +27,7 @@
     <p:sldId id="275" r:id="rId21"/>
     <p:sldId id="276" r:id="rId22"/>
     <p:sldId id="277" r:id="rId23"/>
+    <p:sldId id="278" r:id="rId24"/>
   </p:sldIdLst>
   <p:sldSz cx="12192000" cy="6858000"/>
   <p:notesSz cx="6858000" cy="9144000"/>
@@ -11848,6 +11849,503 @@
 </p:sld>
 </file>
 
+<file path=ppt/slides/slide23.xml><?xml version="1.0" encoding="utf-8"?>
+<p:sld xmlns:a="http://schemas.openxmlformats.org/drawingml/2006/main" xmlns:r="http://schemas.openxmlformats.org/officeDocument/2006/relationships" xmlns:p="http://schemas.openxmlformats.org/presentationml/2006/main">
+  <p:cSld>
+    <p:bg>
+      <p:bgPr>
+        <a:solidFill>
+          <a:schemeClr val="bg1"/>
+        </a:solidFill>
+        <a:effectLst/>
+      </p:bgPr>
+    </p:bg>
+    <p:spTree>
+      <p:nvGrpSpPr>
+        <p:cNvPr id="1" name=""/>
+        <p:cNvGrpSpPr/>
+        <p:nvPr/>
+      </p:nvGrpSpPr>
+      <p:grpSpPr>
+        <a:xfrm>
+          <a:off x="0" y="0"/>
+          <a:ext cx="0" cy="0"/>
+          <a:chOff x="0" y="0"/>
+          <a:chExt cx="0" cy="0"/>
+        </a:xfrm>
+      </p:grpSpPr>
+      <p:grpSp>
+        <p:nvGrpSpPr>
+          <p:cNvPr id="13" name="그룹 12">
+            <a:extLst>
+              <a:ext uri="{FF2B5EF4-FFF2-40B4-BE49-F238E27FC236}">
+                <a16:creationId xmlns:a16="http://schemas.microsoft.com/office/drawing/2014/main" id="{053AF694-C911-4B42-93E0-5F7EF18DE412}"/>
+              </a:ext>
+            </a:extLst>
+          </p:cNvPr>
+          <p:cNvGrpSpPr/>
+          <p:nvPr/>
+        </p:nvGrpSpPr>
+        <p:grpSpPr>
+          <a:xfrm>
+            <a:off x="1973427" y="1233402"/>
+            <a:ext cx="5915850" cy="1190791"/>
+            <a:chOff x="1973427" y="1233402"/>
+            <a:chExt cx="5915850" cy="1190791"/>
+          </a:xfrm>
+        </p:grpSpPr>
+        <p:pic>
+          <p:nvPicPr>
+            <p:cNvPr id="6" name="그림 5">
+              <a:extLst>
+                <a:ext uri="{FF2B5EF4-FFF2-40B4-BE49-F238E27FC236}">
+                  <a16:creationId xmlns:a16="http://schemas.microsoft.com/office/drawing/2014/main" id="{FB24857D-EB02-483F-BDDC-A1159EB143B3}"/>
+                </a:ext>
+              </a:extLst>
+            </p:cNvPr>
+            <p:cNvPicPr>
+              <a:picLocks noChangeAspect="1"/>
+            </p:cNvPicPr>
+            <p:nvPr/>
+          </p:nvPicPr>
+          <p:blipFill>
+            <a:blip r:embed="rId2">
+              <a:extLst>
+                <a:ext uri="{28A0092B-C50C-407E-A947-70E740481C1C}">
+                  <a14:useLocalDpi xmlns:a14="http://schemas.microsoft.com/office/drawing/2010/main" val="0"/>
+                </a:ext>
+              </a:extLst>
+            </a:blip>
+            <a:stretch>
+              <a:fillRect/>
+            </a:stretch>
+          </p:blipFill>
+          <p:spPr>
+            <a:xfrm>
+              <a:off x="1973427" y="1233402"/>
+              <a:ext cx="1971950" cy="1190791"/>
+            </a:xfrm>
+            <a:prstGeom prst="rect">
+              <a:avLst/>
+            </a:prstGeom>
+          </p:spPr>
+        </p:pic>
+        <p:pic>
+          <p:nvPicPr>
+            <p:cNvPr id="9" name="그림 8">
+              <a:extLst>
+                <a:ext uri="{FF2B5EF4-FFF2-40B4-BE49-F238E27FC236}">
+                  <a16:creationId xmlns:a16="http://schemas.microsoft.com/office/drawing/2014/main" id="{6CF5BECC-E05E-4E14-BFE3-3FA18947B4A7}"/>
+                </a:ext>
+              </a:extLst>
+            </p:cNvPr>
+            <p:cNvPicPr>
+              <a:picLocks noChangeAspect="1"/>
+            </p:cNvPicPr>
+            <p:nvPr/>
+          </p:nvPicPr>
+          <p:blipFill>
+            <a:blip r:embed="rId3">
+              <a:extLst>
+                <a:ext uri="{28A0092B-C50C-407E-A947-70E740481C1C}">
+                  <a14:useLocalDpi xmlns:a14="http://schemas.microsoft.com/office/drawing/2010/main" val="0"/>
+                </a:ext>
+              </a:extLst>
+            </a:blip>
+            <a:stretch>
+              <a:fillRect/>
+            </a:stretch>
+          </p:blipFill>
+          <p:spPr>
+            <a:xfrm>
+              <a:off x="3945377" y="1233402"/>
+              <a:ext cx="1971950" cy="1190791"/>
+            </a:xfrm>
+            <a:prstGeom prst="rect">
+              <a:avLst/>
+            </a:prstGeom>
+          </p:spPr>
+        </p:pic>
+        <p:pic>
+          <p:nvPicPr>
+            <p:cNvPr id="12" name="그림 11">
+              <a:extLst>
+                <a:ext uri="{FF2B5EF4-FFF2-40B4-BE49-F238E27FC236}">
+                  <a16:creationId xmlns:a16="http://schemas.microsoft.com/office/drawing/2014/main" id="{D4EF15E2-4DEC-4D8C-B595-DE2962F31AA3}"/>
+                </a:ext>
+              </a:extLst>
+            </p:cNvPr>
+            <p:cNvPicPr>
+              <a:picLocks noChangeAspect="1"/>
+            </p:cNvPicPr>
+            <p:nvPr/>
+          </p:nvPicPr>
+          <p:blipFill>
+            <a:blip r:embed="rId4">
+              <a:extLst>
+                <a:ext uri="{28A0092B-C50C-407E-A947-70E740481C1C}">
+                  <a14:useLocalDpi xmlns:a14="http://schemas.microsoft.com/office/drawing/2010/main" val="0"/>
+                </a:ext>
+              </a:extLst>
+            </a:blip>
+            <a:stretch>
+              <a:fillRect/>
+            </a:stretch>
+          </p:blipFill>
+          <p:spPr>
+            <a:xfrm>
+              <a:off x="5917327" y="1233402"/>
+              <a:ext cx="1971950" cy="1190791"/>
+            </a:xfrm>
+            <a:prstGeom prst="rect">
+              <a:avLst/>
+            </a:prstGeom>
+          </p:spPr>
+        </p:pic>
+      </p:grpSp>
+      <p:grpSp>
+        <p:nvGrpSpPr>
+          <p:cNvPr id="42" name="그룹 41">
+            <a:extLst>
+              <a:ext uri="{FF2B5EF4-FFF2-40B4-BE49-F238E27FC236}">
+                <a16:creationId xmlns:a16="http://schemas.microsoft.com/office/drawing/2014/main" id="{3319250D-B91D-4DB4-9A1E-179F2FC7ADD9}"/>
+              </a:ext>
+            </a:extLst>
+          </p:cNvPr>
+          <p:cNvGrpSpPr/>
+          <p:nvPr/>
+        </p:nvGrpSpPr>
+        <p:grpSpPr>
+          <a:xfrm>
+            <a:off x="1826646" y="2524067"/>
+            <a:ext cx="5111983" cy="1667108"/>
+            <a:chOff x="1826646" y="2524067"/>
+            <a:chExt cx="5111983" cy="1667108"/>
+          </a:xfrm>
+        </p:grpSpPr>
+        <p:pic>
+          <p:nvPicPr>
+            <p:cNvPr id="15" name="그림 14">
+              <a:extLst>
+                <a:ext uri="{FF2B5EF4-FFF2-40B4-BE49-F238E27FC236}">
+                  <a16:creationId xmlns:a16="http://schemas.microsoft.com/office/drawing/2014/main" id="{9B1CBA74-4486-4374-97EF-13D5E5941A62}"/>
+                </a:ext>
+              </a:extLst>
+            </p:cNvPr>
+            <p:cNvPicPr>
+              <a:picLocks noChangeAspect="1"/>
+            </p:cNvPicPr>
+            <p:nvPr/>
+          </p:nvPicPr>
+          <p:blipFill>
+            <a:blip r:embed="rId5">
+              <a:extLst>
+                <a:ext uri="{28A0092B-C50C-407E-A947-70E740481C1C}">
+                  <a14:useLocalDpi xmlns:a14="http://schemas.microsoft.com/office/drawing/2010/main" val="0"/>
+                </a:ext>
+              </a:extLst>
+            </a:blip>
+            <a:stretch>
+              <a:fillRect/>
+            </a:stretch>
+          </p:blipFill>
+          <p:spPr>
+            <a:xfrm>
+              <a:off x="1826646" y="2524067"/>
+              <a:ext cx="1276528" cy="1667108"/>
+            </a:xfrm>
+            <a:prstGeom prst="rect">
+              <a:avLst/>
+            </a:prstGeom>
+          </p:spPr>
+        </p:pic>
+        <p:pic>
+          <p:nvPicPr>
+            <p:cNvPr id="17" name="그림 16">
+              <a:extLst>
+                <a:ext uri="{FF2B5EF4-FFF2-40B4-BE49-F238E27FC236}">
+                  <a16:creationId xmlns:a16="http://schemas.microsoft.com/office/drawing/2014/main" id="{5EEFBB53-80B7-4DCB-BBC1-B8C1BE82E0F0}"/>
+                </a:ext>
+              </a:extLst>
+            </p:cNvPr>
+            <p:cNvPicPr>
+              <a:picLocks noChangeAspect="1"/>
+            </p:cNvPicPr>
+            <p:nvPr/>
+          </p:nvPicPr>
+          <p:blipFill>
+            <a:blip r:embed="rId6">
+              <a:extLst>
+                <a:ext uri="{28A0092B-C50C-407E-A947-70E740481C1C}">
+                  <a14:useLocalDpi xmlns:a14="http://schemas.microsoft.com/office/drawing/2010/main" val="0"/>
+                </a:ext>
+              </a:extLst>
+            </a:blip>
+            <a:stretch>
+              <a:fillRect/>
+            </a:stretch>
+          </p:blipFill>
+          <p:spPr>
+            <a:xfrm>
+              <a:off x="3105131" y="2524067"/>
+              <a:ext cx="1276528" cy="1667108"/>
+            </a:xfrm>
+            <a:prstGeom prst="rect">
+              <a:avLst/>
+            </a:prstGeom>
+          </p:spPr>
+        </p:pic>
+        <p:pic>
+          <p:nvPicPr>
+            <p:cNvPr id="21" name="그림 20">
+              <a:extLst>
+                <a:ext uri="{FF2B5EF4-FFF2-40B4-BE49-F238E27FC236}">
+                  <a16:creationId xmlns:a16="http://schemas.microsoft.com/office/drawing/2014/main" id="{23FFEF83-29FE-4E08-98F5-964608A044DF}"/>
+                </a:ext>
+              </a:extLst>
+            </p:cNvPr>
+            <p:cNvPicPr>
+              <a:picLocks noChangeAspect="1"/>
+            </p:cNvPicPr>
+            <p:nvPr/>
+          </p:nvPicPr>
+          <p:blipFill>
+            <a:blip r:embed="rId7">
+              <a:extLst>
+                <a:ext uri="{28A0092B-C50C-407E-A947-70E740481C1C}">
+                  <a14:useLocalDpi xmlns:a14="http://schemas.microsoft.com/office/drawing/2010/main" val="0"/>
+                </a:ext>
+              </a:extLst>
+            </a:blip>
+            <a:stretch>
+              <a:fillRect/>
+            </a:stretch>
+          </p:blipFill>
+          <p:spPr>
+            <a:xfrm>
+              <a:off x="4383616" y="2524067"/>
+              <a:ext cx="1276528" cy="1667108"/>
+            </a:xfrm>
+            <a:prstGeom prst="rect">
+              <a:avLst/>
+            </a:prstGeom>
+          </p:spPr>
+        </p:pic>
+        <p:pic>
+          <p:nvPicPr>
+            <p:cNvPr id="25" name="그림 24">
+              <a:extLst>
+                <a:ext uri="{FF2B5EF4-FFF2-40B4-BE49-F238E27FC236}">
+                  <a16:creationId xmlns:a16="http://schemas.microsoft.com/office/drawing/2014/main" id="{4F243D32-E590-4482-8261-2E4471D4E294}"/>
+                </a:ext>
+              </a:extLst>
+            </p:cNvPr>
+            <p:cNvPicPr>
+              <a:picLocks noChangeAspect="1"/>
+            </p:cNvPicPr>
+            <p:nvPr/>
+          </p:nvPicPr>
+          <p:blipFill>
+            <a:blip r:embed="rId8">
+              <a:extLst>
+                <a:ext uri="{28A0092B-C50C-407E-A947-70E740481C1C}">
+                  <a14:useLocalDpi xmlns:a14="http://schemas.microsoft.com/office/drawing/2010/main" val="0"/>
+                </a:ext>
+              </a:extLst>
+            </a:blip>
+            <a:stretch>
+              <a:fillRect/>
+            </a:stretch>
+          </p:blipFill>
+          <p:spPr>
+            <a:xfrm>
+              <a:off x="5662101" y="2524067"/>
+              <a:ext cx="1276528" cy="1667108"/>
+            </a:xfrm>
+            <a:prstGeom prst="rect">
+              <a:avLst/>
+            </a:prstGeom>
+          </p:spPr>
+        </p:pic>
+      </p:grpSp>
+      <p:grpSp>
+        <p:nvGrpSpPr>
+          <p:cNvPr id="44" name="그룹 43">
+            <a:extLst>
+              <a:ext uri="{FF2B5EF4-FFF2-40B4-BE49-F238E27FC236}">
+                <a16:creationId xmlns:a16="http://schemas.microsoft.com/office/drawing/2014/main" id="{CD20DFD2-CE63-4A53-9F75-36998FFAD7A3}"/>
+              </a:ext>
+            </a:extLst>
+          </p:cNvPr>
+          <p:cNvGrpSpPr/>
+          <p:nvPr/>
+        </p:nvGrpSpPr>
+        <p:grpSpPr>
+          <a:xfrm>
+            <a:off x="1648300" y="4495236"/>
+            <a:ext cx="4229692" cy="1667108"/>
+            <a:chOff x="1648300" y="4495236"/>
+            <a:chExt cx="4229692" cy="1667108"/>
+          </a:xfrm>
+        </p:grpSpPr>
+        <p:pic>
+          <p:nvPicPr>
+            <p:cNvPr id="29" name="그림 28">
+              <a:extLst>
+                <a:ext uri="{FF2B5EF4-FFF2-40B4-BE49-F238E27FC236}">
+                  <a16:creationId xmlns:a16="http://schemas.microsoft.com/office/drawing/2014/main" id="{17B097E9-5248-4A04-839F-119BF0F0723B}"/>
+                </a:ext>
+              </a:extLst>
+            </p:cNvPr>
+            <p:cNvPicPr>
+              <a:picLocks noChangeAspect="1"/>
+            </p:cNvPicPr>
+            <p:nvPr/>
+          </p:nvPicPr>
+          <p:blipFill>
+            <a:blip r:embed="rId9">
+              <a:extLst>
+                <a:ext uri="{28A0092B-C50C-407E-A947-70E740481C1C}">
+                  <a14:useLocalDpi xmlns:a14="http://schemas.microsoft.com/office/drawing/2010/main" val="0"/>
+                </a:ext>
+              </a:extLst>
+            </a:blip>
+            <a:stretch>
+              <a:fillRect/>
+            </a:stretch>
+          </p:blipFill>
+          <p:spPr>
+            <a:xfrm>
+              <a:off x="1648300" y="4495236"/>
+              <a:ext cx="1057423" cy="1667108"/>
+            </a:xfrm>
+            <a:prstGeom prst="rect">
+              <a:avLst/>
+            </a:prstGeom>
+          </p:spPr>
+        </p:pic>
+        <p:pic>
+          <p:nvPicPr>
+            <p:cNvPr id="33" name="그림 32">
+              <a:extLst>
+                <a:ext uri="{FF2B5EF4-FFF2-40B4-BE49-F238E27FC236}">
+                  <a16:creationId xmlns:a16="http://schemas.microsoft.com/office/drawing/2014/main" id="{5FF42E90-A553-4BCB-98F9-DB6121D39340}"/>
+                </a:ext>
+              </a:extLst>
+            </p:cNvPr>
+            <p:cNvPicPr>
+              <a:picLocks noChangeAspect="1"/>
+            </p:cNvPicPr>
+            <p:nvPr/>
+          </p:nvPicPr>
+          <p:blipFill>
+            <a:blip r:embed="rId10">
+              <a:extLst>
+                <a:ext uri="{28A0092B-C50C-407E-A947-70E740481C1C}">
+                  <a14:useLocalDpi xmlns:a14="http://schemas.microsoft.com/office/drawing/2010/main" val="0"/>
+                </a:ext>
+              </a:extLst>
+            </a:blip>
+            <a:stretch>
+              <a:fillRect/>
+            </a:stretch>
+          </p:blipFill>
+          <p:spPr>
+            <a:xfrm>
+              <a:off x="2705723" y="4495236"/>
+              <a:ext cx="1057423" cy="1667108"/>
+            </a:xfrm>
+            <a:prstGeom prst="rect">
+              <a:avLst/>
+            </a:prstGeom>
+          </p:spPr>
+        </p:pic>
+        <p:pic>
+          <p:nvPicPr>
+            <p:cNvPr id="37" name="그림 36">
+              <a:extLst>
+                <a:ext uri="{FF2B5EF4-FFF2-40B4-BE49-F238E27FC236}">
+                  <a16:creationId xmlns:a16="http://schemas.microsoft.com/office/drawing/2014/main" id="{090299C0-66DF-49B0-BC0D-3776DBFFE16E}"/>
+                </a:ext>
+              </a:extLst>
+            </p:cNvPr>
+            <p:cNvPicPr>
+              <a:picLocks noChangeAspect="1"/>
+            </p:cNvPicPr>
+            <p:nvPr/>
+          </p:nvPicPr>
+          <p:blipFill>
+            <a:blip r:embed="rId11">
+              <a:extLst>
+                <a:ext uri="{28A0092B-C50C-407E-A947-70E740481C1C}">
+                  <a14:useLocalDpi xmlns:a14="http://schemas.microsoft.com/office/drawing/2010/main" val="0"/>
+                </a:ext>
+              </a:extLst>
+            </a:blip>
+            <a:stretch>
+              <a:fillRect/>
+            </a:stretch>
+          </p:blipFill>
+          <p:spPr>
+            <a:xfrm>
+              <a:off x="3763146" y="4495236"/>
+              <a:ext cx="1057423" cy="1667108"/>
+            </a:xfrm>
+            <a:prstGeom prst="rect">
+              <a:avLst/>
+            </a:prstGeom>
+          </p:spPr>
+        </p:pic>
+        <p:pic>
+          <p:nvPicPr>
+            <p:cNvPr id="41" name="그림 40">
+              <a:extLst>
+                <a:ext uri="{FF2B5EF4-FFF2-40B4-BE49-F238E27FC236}">
+                  <a16:creationId xmlns:a16="http://schemas.microsoft.com/office/drawing/2014/main" id="{EF44A68C-E32C-41E7-81C8-9EB39EF7D20A}"/>
+                </a:ext>
+              </a:extLst>
+            </p:cNvPr>
+            <p:cNvPicPr>
+              <a:picLocks noChangeAspect="1"/>
+            </p:cNvPicPr>
+            <p:nvPr/>
+          </p:nvPicPr>
+          <p:blipFill>
+            <a:blip r:embed="rId12">
+              <a:extLst>
+                <a:ext uri="{28A0092B-C50C-407E-A947-70E740481C1C}">
+                  <a14:useLocalDpi xmlns:a14="http://schemas.microsoft.com/office/drawing/2010/main" val="0"/>
+                </a:ext>
+              </a:extLst>
+            </a:blip>
+            <a:stretch>
+              <a:fillRect/>
+            </a:stretch>
+          </p:blipFill>
+          <p:spPr>
+            <a:xfrm>
+              <a:off x="4820569" y="4495236"/>
+              <a:ext cx="1057423" cy="1667108"/>
+            </a:xfrm>
+            <a:prstGeom prst="rect">
+              <a:avLst/>
+            </a:prstGeom>
+          </p:spPr>
+        </p:pic>
+      </p:grpSp>
+    </p:spTree>
+    <p:extLst>
+      <p:ext uri="{BB962C8B-B14F-4D97-AF65-F5344CB8AC3E}">
+        <p14:creationId xmlns:p14="http://schemas.microsoft.com/office/powerpoint/2010/main" val="2744814624"/>
+      </p:ext>
+    </p:extLst>
+  </p:cSld>
+  <p:clrMapOvr>
+    <a:masterClrMapping/>
+  </p:clrMapOvr>
+</p:sld>
+</file>
+
 <file path=ppt/slides/slide3.xml><?xml version="1.0" encoding="utf-8"?>
 <p:sld xmlns:a="http://schemas.openxmlformats.org/drawingml/2006/main" xmlns:r="http://schemas.openxmlformats.org/officeDocument/2006/relationships" xmlns:p="http://schemas.openxmlformats.org/presentationml/2006/main">
   <p:cSld>

</xml_diff>

<commit_message>
pause_state 구현 / 플레이어 죽는 effect 구현 / clear_state 구현
</commit_message>
<xml_diff>
--- a/제작.pptx
+++ b/제작.pptx
@@ -28,6 +28,8 @@
     <p:sldId id="276" r:id="rId22"/>
     <p:sldId id="277" r:id="rId23"/>
     <p:sldId id="278" r:id="rId24"/>
+    <p:sldId id="279" r:id="rId25"/>
+    <p:sldId id="281" r:id="rId26"/>
   </p:sldIdLst>
   <p:sldSz cx="12192000" cy="6858000"/>
   <p:notesSz cx="6858000" cy="9144000"/>
@@ -12346,6 +12348,632 @@
 </p:sld>
 </file>
 
+<file path=ppt/slides/slide24.xml><?xml version="1.0" encoding="utf-8"?>
+<p:sld xmlns:a="http://schemas.openxmlformats.org/drawingml/2006/main" xmlns:r="http://schemas.openxmlformats.org/officeDocument/2006/relationships" xmlns:p="http://schemas.openxmlformats.org/presentationml/2006/main">
+  <p:cSld>
+    <p:bg>
+      <p:bgPr>
+        <a:solidFill>
+          <a:srgbClr val="FA7512"/>
+        </a:solidFill>
+        <a:effectLst/>
+      </p:bgPr>
+    </p:bg>
+    <p:spTree>
+      <p:nvGrpSpPr>
+        <p:cNvPr id="1" name=""/>
+        <p:cNvGrpSpPr/>
+        <p:nvPr/>
+      </p:nvGrpSpPr>
+      <p:grpSpPr>
+        <a:xfrm>
+          <a:off x="0" y="0"/>
+          <a:ext cx="0" cy="0"/>
+          <a:chOff x="0" y="0"/>
+          <a:chExt cx="0" cy="0"/>
+        </a:xfrm>
+      </p:grpSpPr>
+      <p:pic>
+        <p:nvPicPr>
+          <p:cNvPr id="6" name="그림 5">
+            <a:extLst>
+              <a:ext uri="{FF2B5EF4-FFF2-40B4-BE49-F238E27FC236}">
+                <a16:creationId xmlns:a16="http://schemas.microsoft.com/office/drawing/2014/main" id="{75E2DF46-DB9A-4C05-AB1C-E9B07AFBAFCA}"/>
+              </a:ext>
+            </a:extLst>
+          </p:cNvPr>
+          <p:cNvPicPr>
+            <a:picLocks noChangeAspect="1"/>
+          </p:cNvPicPr>
+          <p:nvPr/>
+        </p:nvPicPr>
+        <p:blipFill>
+          <a:blip r:embed="rId2">
+            <a:extLst>
+              <a:ext uri="{28A0092B-C50C-407E-A947-70E740481C1C}">
+                <a14:useLocalDpi xmlns:a14="http://schemas.microsoft.com/office/drawing/2010/main" val="0"/>
+              </a:ext>
+            </a:extLst>
+          </a:blip>
+          <a:stretch>
+            <a:fillRect/>
+          </a:stretch>
+        </p:blipFill>
+        <p:spPr>
+          <a:xfrm>
+            <a:off x="5533947" y="2943157"/>
+            <a:ext cx="1124107" cy="971686"/>
+          </a:xfrm>
+          <a:prstGeom prst="rect">
+            <a:avLst/>
+          </a:prstGeom>
+        </p:spPr>
+      </p:pic>
+      <p:sp>
+        <p:nvSpPr>
+          <p:cNvPr id="7" name="타원 6">
+            <a:extLst>
+              <a:ext uri="{FF2B5EF4-FFF2-40B4-BE49-F238E27FC236}">
+                <a16:creationId xmlns:a16="http://schemas.microsoft.com/office/drawing/2014/main" id="{05FF6E39-C99F-4C80-A060-43E2A0C0BEBA}"/>
+              </a:ext>
+            </a:extLst>
+          </p:cNvPr>
+          <p:cNvSpPr/>
+          <p:nvPr/>
+        </p:nvSpPr>
+        <p:spPr>
+          <a:xfrm>
+            <a:off x="5105398" y="2438400"/>
+            <a:ext cx="1981204" cy="1981200"/>
+          </a:xfrm>
+          <a:prstGeom prst="ellipse">
+            <a:avLst/>
+          </a:prstGeom>
+          <a:gradFill flip="none" rotWithShape="1">
+            <a:gsLst>
+              <a:gs pos="0">
+                <a:srgbClr val="B0E345">
+                  <a:alpha val="0"/>
+                </a:srgbClr>
+              </a:gs>
+              <a:gs pos="100000">
+                <a:srgbClr val="B3E846">
+                  <a:alpha val="0"/>
+                </a:srgbClr>
+              </a:gs>
+              <a:gs pos="76000">
+                <a:srgbClr val="B3E846">
+                  <a:alpha val="52000"/>
+                </a:srgbClr>
+              </a:gs>
+            </a:gsLst>
+            <a:path path="circle">
+              <a:fillToRect l="50000" t="50000" r="50000" b="50000"/>
+            </a:path>
+            <a:tileRect/>
+          </a:gradFill>
+          <a:ln>
+            <a:noFill/>
+          </a:ln>
+        </p:spPr>
+        <p:style>
+          <a:lnRef idx="2">
+            <a:schemeClr val="accent1">
+              <a:shade val="50000"/>
+            </a:schemeClr>
+          </a:lnRef>
+          <a:fillRef idx="1">
+            <a:schemeClr val="accent1"/>
+          </a:fillRef>
+          <a:effectRef idx="0">
+            <a:schemeClr val="accent1"/>
+          </a:effectRef>
+          <a:fontRef idx="minor">
+            <a:schemeClr val="lt1"/>
+          </a:fontRef>
+        </p:style>
+        <p:txBody>
+          <a:bodyPr rtlCol="0" anchor="ctr"/>
+          <a:lstStyle/>
+          <a:p>
+            <a:pPr algn="ctr"/>
+            <a:endParaRPr lang="ko-KR" altLang="en-US"/>
+          </a:p>
+        </p:txBody>
+      </p:sp>
+      <p:sp>
+        <p:nvSpPr>
+          <p:cNvPr id="10" name="TextBox 9">
+            <a:extLst>
+              <a:ext uri="{FF2B5EF4-FFF2-40B4-BE49-F238E27FC236}">
+                <a16:creationId xmlns:a16="http://schemas.microsoft.com/office/drawing/2014/main" id="{4EEE3C46-A719-4655-80E4-5BCD6174ECB5}"/>
+              </a:ext>
+            </a:extLst>
+          </p:cNvPr>
+          <p:cNvSpPr txBox="1"/>
+          <p:nvPr/>
+        </p:nvSpPr>
+        <p:spPr>
+          <a:xfrm rot="20620180">
+            <a:off x="3982352" y="1976734"/>
+            <a:ext cx="3884397" cy="923330"/>
+          </a:xfrm>
+          <a:prstGeom prst="rect">
+            <a:avLst/>
+          </a:prstGeom>
+          <a:noFill/>
+        </p:spPr>
+        <p:txBody>
+          <a:bodyPr wrap="none" rtlCol="0">
+            <a:spAutoFit/>
+          </a:bodyPr>
+          <a:lstStyle/>
+          <a:p>
+            <a:r>
+              <a:rPr lang="en-US" altLang="ko-KR" sz="5400" dirty="0">
+                <a:solidFill>
+                  <a:schemeClr val="bg1"/>
+                </a:solidFill>
+                <a:latin typeface="pingwing" panose="02000603000000000000" pitchFamily="2" charset="0"/>
+                <a:ea typeface="pingwing" panose="02000603000000000000" pitchFamily="2" charset="0"/>
+              </a:rPr>
+              <a:t>GAME CLEAR</a:t>
+            </a:r>
+            <a:endParaRPr lang="ko-KR" altLang="en-US" sz="5400" dirty="0">
+              <a:solidFill>
+                <a:schemeClr val="bg1"/>
+              </a:solidFill>
+              <a:latin typeface="pingwing" panose="02000603000000000000" pitchFamily="2" charset="0"/>
+            </a:endParaRPr>
+          </a:p>
+        </p:txBody>
+      </p:sp>
+      <p:sp>
+        <p:nvSpPr>
+          <p:cNvPr id="18" name="TextBox 17">
+            <a:extLst>
+              <a:ext uri="{FF2B5EF4-FFF2-40B4-BE49-F238E27FC236}">
+                <a16:creationId xmlns:a16="http://schemas.microsoft.com/office/drawing/2014/main" id="{3FB54ECD-3111-4FFA-BB7A-C4D1E54A9046}"/>
+              </a:ext>
+            </a:extLst>
+          </p:cNvPr>
+          <p:cNvSpPr txBox="1"/>
+          <p:nvPr/>
+        </p:nvSpPr>
+        <p:spPr>
+          <a:xfrm>
+            <a:off x="4215870" y="4539635"/>
+            <a:ext cx="3760260" cy="523220"/>
+          </a:xfrm>
+          <a:prstGeom prst="rect">
+            <a:avLst/>
+          </a:prstGeom>
+          <a:noFill/>
+        </p:spPr>
+        <p:txBody>
+          <a:bodyPr wrap="none" rtlCol="0">
+            <a:spAutoFit/>
+          </a:bodyPr>
+          <a:lstStyle/>
+          <a:p>
+            <a:r>
+              <a:rPr lang="en-US" altLang="ko-KR" sz="2800" dirty="0">
+                <a:latin typeface="pingwing" panose="02000603000000000000" pitchFamily="2" charset="0"/>
+                <a:ea typeface="pingwing" panose="02000603000000000000" pitchFamily="2" charset="0"/>
+              </a:rPr>
+              <a:t>PRESS SPACE TO EXIT...</a:t>
+            </a:r>
+            <a:endParaRPr lang="ko-KR" altLang="en-US" sz="2800" dirty="0">
+              <a:latin typeface="pingwing" panose="02000603000000000000" pitchFamily="2" charset="0"/>
+            </a:endParaRPr>
+          </a:p>
+        </p:txBody>
+      </p:sp>
+    </p:spTree>
+    <p:extLst>
+      <p:ext uri="{BB962C8B-B14F-4D97-AF65-F5344CB8AC3E}">
+        <p14:creationId xmlns:p14="http://schemas.microsoft.com/office/powerpoint/2010/main" val="1484250324"/>
+      </p:ext>
+    </p:extLst>
+  </p:cSld>
+  <p:clrMapOvr>
+    <a:masterClrMapping/>
+  </p:clrMapOvr>
+</p:sld>
+</file>
+
+<file path=ppt/slides/slide25.xml><?xml version="1.0" encoding="utf-8"?>
+<p:sld xmlns:a="http://schemas.openxmlformats.org/drawingml/2006/main" xmlns:r="http://schemas.openxmlformats.org/officeDocument/2006/relationships" xmlns:p="http://schemas.openxmlformats.org/presentationml/2006/main">
+  <p:cSld>
+    <p:bg>
+      <p:bgPr>
+        <a:solidFill>
+          <a:schemeClr val="bg1"/>
+        </a:solidFill>
+        <a:effectLst/>
+      </p:bgPr>
+    </p:bg>
+    <p:spTree>
+      <p:nvGrpSpPr>
+        <p:cNvPr id="1" name=""/>
+        <p:cNvGrpSpPr/>
+        <p:nvPr/>
+      </p:nvGrpSpPr>
+      <p:grpSpPr>
+        <a:xfrm>
+          <a:off x="0" y="0"/>
+          <a:ext cx="0" cy="0"/>
+          <a:chOff x="0" y="0"/>
+          <a:chExt cx="0" cy="0"/>
+        </a:xfrm>
+      </p:grpSpPr>
+      <p:sp>
+        <p:nvSpPr>
+          <p:cNvPr id="26" name="자유형: 도형 25">
+            <a:extLst>
+              <a:ext uri="{FF2B5EF4-FFF2-40B4-BE49-F238E27FC236}">
+                <a16:creationId xmlns:a16="http://schemas.microsoft.com/office/drawing/2014/main" id="{0404C5A5-E6C8-49D3-8F8C-6A8D99553FE3}"/>
+              </a:ext>
+            </a:extLst>
+          </p:cNvPr>
+          <p:cNvSpPr/>
+          <p:nvPr/>
+        </p:nvSpPr>
+        <p:spPr>
+          <a:xfrm>
+            <a:off x="5311806" y="2644806"/>
+            <a:ext cx="1568388" cy="1568388"/>
+          </a:xfrm>
+          <a:custGeom>
+            <a:avLst/>
+            <a:gdLst>
+              <a:gd name="connsiteX0" fmla="*/ 1436334 w 2494626"/>
+              <a:gd name="connsiteY0" fmla="*/ 623657 h 2494626"/>
+              <a:gd name="connsiteX1" fmla="*/ 1436334 w 2494626"/>
+              <a:gd name="connsiteY1" fmla="*/ 1870969 h 2494626"/>
+              <a:gd name="connsiteX2" fmla="*/ 1791440 w 2494626"/>
+              <a:gd name="connsiteY2" fmla="*/ 1870969 h 2494626"/>
+              <a:gd name="connsiteX3" fmla="*/ 1791440 w 2494626"/>
+              <a:gd name="connsiteY3" fmla="*/ 623657 h 2494626"/>
+              <a:gd name="connsiteX4" fmla="*/ 703186 w 2494626"/>
+              <a:gd name="connsiteY4" fmla="*/ 623657 h 2494626"/>
+              <a:gd name="connsiteX5" fmla="*/ 703186 w 2494626"/>
+              <a:gd name="connsiteY5" fmla="*/ 1870969 h 2494626"/>
+              <a:gd name="connsiteX6" fmla="*/ 1058292 w 2494626"/>
+              <a:gd name="connsiteY6" fmla="*/ 1870969 h 2494626"/>
+              <a:gd name="connsiteX7" fmla="*/ 1058292 w 2494626"/>
+              <a:gd name="connsiteY7" fmla="*/ 623657 h 2494626"/>
+              <a:gd name="connsiteX8" fmla="*/ 1247313 w 2494626"/>
+              <a:gd name="connsiteY8" fmla="*/ 0 h 2494626"/>
+              <a:gd name="connsiteX9" fmla="*/ 2494626 w 2494626"/>
+              <a:gd name="connsiteY9" fmla="*/ 1247313 h 2494626"/>
+              <a:gd name="connsiteX10" fmla="*/ 1247313 w 2494626"/>
+              <a:gd name="connsiteY10" fmla="*/ 2494626 h 2494626"/>
+              <a:gd name="connsiteX11" fmla="*/ 0 w 2494626"/>
+              <a:gd name="connsiteY11" fmla="*/ 1247313 h 2494626"/>
+              <a:gd name="connsiteX12" fmla="*/ 1247313 w 2494626"/>
+              <a:gd name="connsiteY12" fmla="*/ 0 h 2494626"/>
+            </a:gdLst>
+            <a:ahLst/>
+            <a:cxnLst>
+              <a:cxn ang="0">
+                <a:pos x="connsiteX0" y="connsiteY0"/>
+              </a:cxn>
+              <a:cxn ang="0">
+                <a:pos x="connsiteX1" y="connsiteY1"/>
+              </a:cxn>
+              <a:cxn ang="0">
+                <a:pos x="connsiteX2" y="connsiteY2"/>
+              </a:cxn>
+              <a:cxn ang="0">
+                <a:pos x="connsiteX3" y="connsiteY3"/>
+              </a:cxn>
+              <a:cxn ang="0">
+                <a:pos x="connsiteX4" y="connsiteY4"/>
+              </a:cxn>
+              <a:cxn ang="0">
+                <a:pos x="connsiteX5" y="connsiteY5"/>
+              </a:cxn>
+              <a:cxn ang="0">
+                <a:pos x="connsiteX6" y="connsiteY6"/>
+              </a:cxn>
+              <a:cxn ang="0">
+                <a:pos x="connsiteX7" y="connsiteY7"/>
+              </a:cxn>
+              <a:cxn ang="0">
+                <a:pos x="connsiteX8" y="connsiteY8"/>
+              </a:cxn>
+              <a:cxn ang="0">
+                <a:pos x="connsiteX9" y="connsiteY9"/>
+              </a:cxn>
+              <a:cxn ang="0">
+                <a:pos x="connsiteX10" y="connsiteY10"/>
+              </a:cxn>
+              <a:cxn ang="0">
+                <a:pos x="connsiteX11" y="connsiteY11"/>
+              </a:cxn>
+              <a:cxn ang="0">
+                <a:pos x="connsiteX12" y="connsiteY12"/>
+              </a:cxn>
+            </a:cxnLst>
+            <a:rect l="l" t="t" r="r" b="b"/>
+            <a:pathLst>
+              <a:path w="2494626" h="2494626">
+                <a:moveTo>
+                  <a:pt x="1436334" y="623657"/>
+                </a:moveTo>
+                <a:lnTo>
+                  <a:pt x="1436334" y="1870969"/>
+                </a:lnTo>
+                <a:lnTo>
+                  <a:pt x="1791440" y="1870969"/>
+                </a:lnTo>
+                <a:lnTo>
+                  <a:pt x="1791440" y="623657"/>
+                </a:lnTo>
+                <a:close/>
+                <a:moveTo>
+                  <a:pt x="703186" y="623657"/>
+                </a:moveTo>
+                <a:lnTo>
+                  <a:pt x="703186" y="1870969"/>
+                </a:lnTo>
+                <a:lnTo>
+                  <a:pt x="1058292" y="1870969"/>
+                </a:lnTo>
+                <a:lnTo>
+                  <a:pt x="1058292" y="623657"/>
+                </a:lnTo>
+                <a:close/>
+                <a:moveTo>
+                  <a:pt x="1247313" y="0"/>
+                </a:moveTo>
+                <a:cubicBezTo>
+                  <a:pt x="1936185" y="0"/>
+                  <a:pt x="2494626" y="558441"/>
+                  <a:pt x="2494626" y="1247313"/>
+                </a:cubicBezTo>
+                <a:cubicBezTo>
+                  <a:pt x="2494626" y="1936185"/>
+                  <a:pt x="1936185" y="2494626"/>
+                  <a:pt x="1247313" y="2494626"/>
+                </a:cubicBezTo>
+                <a:cubicBezTo>
+                  <a:pt x="558441" y="2494626"/>
+                  <a:pt x="0" y="1936185"/>
+                  <a:pt x="0" y="1247313"/>
+                </a:cubicBezTo>
+                <a:cubicBezTo>
+                  <a:pt x="0" y="558441"/>
+                  <a:pt x="558441" y="0"/>
+                  <a:pt x="1247313" y="0"/>
+                </a:cubicBezTo>
+                <a:close/>
+              </a:path>
+            </a:pathLst>
+          </a:custGeom>
+          <a:solidFill>
+            <a:schemeClr val="accent2"/>
+          </a:solidFill>
+          <a:ln>
+            <a:noFill/>
+          </a:ln>
+        </p:spPr>
+        <p:style>
+          <a:lnRef idx="2">
+            <a:schemeClr val="accent1">
+              <a:shade val="50000"/>
+            </a:schemeClr>
+          </a:lnRef>
+          <a:fillRef idx="1">
+            <a:schemeClr val="accent1"/>
+          </a:fillRef>
+          <a:effectRef idx="0">
+            <a:schemeClr val="accent1"/>
+          </a:effectRef>
+          <a:fontRef idx="minor">
+            <a:schemeClr val="lt1"/>
+          </a:fontRef>
+        </p:style>
+        <p:txBody>
+          <a:bodyPr rtlCol="0" anchor="ctr"/>
+          <a:lstStyle/>
+          <a:p>
+            <a:pPr algn="ctr"/>
+            <a:endParaRPr lang="ko-KR" altLang="en-US"/>
+          </a:p>
+        </p:txBody>
+      </p:sp>
+      <p:sp>
+        <p:nvSpPr>
+          <p:cNvPr id="27" name="자유형: 도형 26">
+            <a:extLst>
+              <a:ext uri="{FF2B5EF4-FFF2-40B4-BE49-F238E27FC236}">
+                <a16:creationId xmlns:a16="http://schemas.microsoft.com/office/drawing/2014/main" id="{61FA0419-53CF-46A2-95DC-49178825134D}"/>
+              </a:ext>
+            </a:extLst>
+          </p:cNvPr>
+          <p:cNvSpPr/>
+          <p:nvPr/>
+        </p:nvSpPr>
+        <p:spPr>
+          <a:xfrm>
+            <a:off x="649549" y="308498"/>
+            <a:ext cx="2494626" cy="2494626"/>
+          </a:xfrm>
+          <a:custGeom>
+            <a:avLst/>
+            <a:gdLst>
+              <a:gd name="connsiteX0" fmla="*/ 1436334 w 2494626"/>
+              <a:gd name="connsiteY0" fmla="*/ 623657 h 2494626"/>
+              <a:gd name="connsiteX1" fmla="*/ 1436334 w 2494626"/>
+              <a:gd name="connsiteY1" fmla="*/ 1870969 h 2494626"/>
+              <a:gd name="connsiteX2" fmla="*/ 1791440 w 2494626"/>
+              <a:gd name="connsiteY2" fmla="*/ 1870969 h 2494626"/>
+              <a:gd name="connsiteX3" fmla="*/ 1791440 w 2494626"/>
+              <a:gd name="connsiteY3" fmla="*/ 623657 h 2494626"/>
+              <a:gd name="connsiteX4" fmla="*/ 703186 w 2494626"/>
+              <a:gd name="connsiteY4" fmla="*/ 623657 h 2494626"/>
+              <a:gd name="connsiteX5" fmla="*/ 703186 w 2494626"/>
+              <a:gd name="connsiteY5" fmla="*/ 1870969 h 2494626"/>
+              <a:gd name="connsiteX6" fmla="*/ 1058292 w 2494626"/>
+              <a:gd name="connsiteY6" fmla="*/ 1870969 h 2494626"/>
+              <a:gd name="connsiteX7" fmla="*/ 1058292 w 2494626"/>
+              <a:gd name="connsiteY7" fmla="*/ 623657 h 2494626"/>
+              <a:gd name="connsiteX8" fmla="*/ 1247313 w 2494626"/>
+              <a:gd name="connsiteY8" fmla="*/ 0 h 2494626"/>
+              <a:gd name="connsiteX9" fmla="*/ 2494626 w 2494626"/>
+              <a:gd name="connsiteY9" fmla="*/ 1247313 h 2494626"/>
+              <a:gd name="connsiteX10" fmla="*/ 1247313 w 2494626"/>
+              <a:gd name="connsiteY10" fmla="*/ 2494626 h 2494626"/>
+              <a:gd name="connsiteX11" fmla="*/ 0 w 2494626"/>
+              <a:gd name="connsiteY11" fmla="*/ 1247313 h 2494626"/>
+              <a:gd name="connsiteX12" fmla="*/ 1247313 w 2494626"/>
+              <a:gd name="connsiteY12" fmla="*/ 0 h 2494626"/>
+            </a:gdLst>
+            <a:ahLst/>
+            <a:cxnLst>
+              <a:cxn ang="0">
+                <a:pos x="connsiteX0" y="connsiteY0"/>
+              </a:cxn>
+              <a:cxn ang="0">
+                <a:pos x="connsiteX1" y="connsiteY1"/>
+              </a:cxn>
+              <a:cxn ang="0">
+                <a:pos x="connsiteX2" y="connsiteY2"/>
+              </a:cxn>
+              <a:cxn ang="0">
+                <a:pos x="connsiteX3" y="connsiteY3"/>
+              </a:cxn>
+              <a:cxn ang="0">
+                <a:pos x="connsiteX4" y="connsiteY4"/>
+              </a:cxn>
+              <a:cxn ang="0">
+                <a:pos x="connsiteX5" y="connsiteY5"/>
+              </a:cxn>
+              <a:cxn ang="0">
+                <a:pos x="connsiteX6" y="connsiteY6"/>
+              </a:cxn>
+              <a:cxn ang="0">
+                <a:pos x="connsiteX7" y="connsiteY7"/>
+              </a:cxn>
+              <a:cxn ang="0">
+                <a:pos x="connsiteX8" y="connsiteY8"/>
+              </a:cxn>
+              <a:cxn ang="0">
+                <a:pos x="connsiteX9" y="connsiteY9"/>
+              </a:cxn>
+              <a:cxn ang="0">
+                <a:pos x="connsiteX10" y="connsiteY10"/>
+              </a:cxn>
+              <a:cxn ang="0">
+                <a:pos x="connsiteX11" y="connsiteY11"/>
+              </a:cxn>
+              <a:cxn ang="0">
+                <a:pos x="connsiteX12" y="connsiteY12"/>
+              </a:cxn>
+            </a:cxnLst>
+            <a:rect l="l" t="t" r="r" b="b"/>
+            <a:pathLst>
+              <a:path w="2494626" h="2494626">
+                <a:moveTo>
+                  <a:pt x="1436334" y="623657"/>
+                </a:moveTo>
+                <a:lnTo>
+                  <a:pt x="1436334" y="1870969"/>
+                </a:lnTo>
+                <a:lnTo>
+                  <a:pt x="1791440" y="1870969"/>
+                </a:lnTo>
+                <a:lnTo>
+                  <a:pt x="1791440" y="623657"/>
+                </a:lnTo>
+                <a:close/>
+                <a:moveTo>
+                  <a:pt x="703186" y="623657"/>
+                </a:moveTo>
+                <a:lnTo>
+                  <a:pt x="703186" y="1870969"/>
+                </a:lnTo>
+                <a:lnTo>
+                  <a:pt x="1058292" y="1870969"/>
+                </a:lnTo>
+                <a:lnTo>
+                  <a:pt x="1058292" y="623657"/>
+                </a:lnTo>
+                <a:close/>
+                <a:moveTo>
+                  <a:pt x="1247313" y="0"/>
+                </a:moveTo>
+                <a:cubicBezTo>
+                  <a:pt x="1936185" y="0"/>
+                  <a:pt x="2494626" y="558441"/>
+                  <a:pt x="2494626" y="1247313"/>
+                </a:cubicBezTo>
+                <a:cubicBezTo>
+                  <a:pt x="2494626" y="1936185"/>
+                  <a:pt x="1936185" y="2494626"/>
+                  <a:pt x="1247313" y="2494626"/>
+                </a:cubicBezTo>
+                <a:cubicBezTo>
+                  <a:pt x="558441" y="2494626"/>
+                  <a:pt x="0" y="1936185"/>
+                  <a:pt x="0" y="1247313"/>
+                </a:cubicBezTo>
+                <a:cubicBezTo>
+                  <a:pt x="0" y="558441"/>
+                  <a:pt x="558441" y="0"/>
+                  <a:pt x="1247313" y="0"/>
+                </a:cubicBezTo>
+                <a:close/>
+              </a:path>
+            </a:pathLst>
+          </a:custGeom>
+          <a:solidFill>
+            <a:schemeClr val="accent2"/>
+          </a:solidFill>
+          <a:ln>
+            <a:noFill/>
+          </a:ln>
+        </p:spPr>
+        <p:style>
+          <a:lnRef idx="2">
+            <a:schemeClr val="accent1">
+              <a:shade val="50000"/>
+            </a:schemeClr>
+          </a:lnRef>
+          <a:fillRef idx="1">
+            <a:schemeClr val="accent1"/>
+          </a:fillRef>
+          <a:effectRef idx="0">
+            <a:schemeClr val="accent1"/>
+          </a:effectRef>
+          <a:fontRef idx="minor">
+            <a:schemeClr val="lt1"/>
+          </a:fontRef>
+        </p:style>
+        <p:txBody>
+          <a:bodyPr rtlCol="0" anchor="ctr"/>
+          <a:lstStyle/>
+          <a:p>
+            <a:pPr algn="ctr"/>
+            <a:endParaRPr lang="ko-KR" altLang="en-US"/>
+          </a:p>
+        </p:txBody>
+      </p:sp>
+    </p:spTree>
+    <p:extLst>
+      <p:ext uri="{BB962C8B-B14F-4D97-AF65-F5344CB8AC3E}">
+        <p14:creationId xmlns:p14="http://schemas.microsoft.com/office/powerpoint/2010/main" val="1567388650"/>
+      </p:ext>
+    </p:extLst>
+  </p:cSld>
+  <p:clrMapOvr>
+    <a:masterClrMapping/>
+  </p:clrMapOvr>
+</p:sld>
+</file>
+
 <file path=ppt/slides/slide3.xml><?xml version="1.0" encoding="utf-8"?>
 <p:sld xmlns:a="http://schemas.openxmlformats.org/drawingml/2006/main" xmlns:r="http://schemas.openxmlformats.org/officeDocument/2006/relationships" xmlns:p="http://schemas.openxmlformats.org/presentationml/2006/main">
   <p:cSld>

</xml_diff>